<commit_message>
Ajout scripts BPE Loyers et Merge
</commit_message>
<xml_diff>
--- a/Réflexion Projet/Préparation des données_v2.pptx
+++ b/Réflexion Projet/Préparation des données_v2.pptx
@@ -3394,13 +3394,6 @@
               <a:t>DVF</a:t>
             </a:r>
           </a:p>
-          <a:p>
-            <a:pPr algn="ctr"/>
-            <a:r>
-              <a:rPr lang="en-US" dirty="0"/>
-              <a:t>(2020)</a:t>
-            </a:r>
-          </a:p>
         </p:txBody>
       </p:sp>
       <p:sp>
@@ -3848,10 +3841,17 @@
           <a:p>
             <a:pPr algn="ctr"/>
             <a:r>
+              <a:rPr lang="en-US" dirty="0"/>
+              <a:t>5 – Nb </a:t>
+            </a:r>
+            <a:r>
               <a:rPr lang="en-US" dirty="0" err="1"/>
-              <a:t>bpe_clean</a:t>
-            </a:r>
-            <a:endParaRPr lang="en-US" dirty="0"/>
+              <a:t>Equipements</a:t>
+            </a:r>
+            <a:r>
+              <a:rPr lang="en-US" dirty="0"/>
+              <a:t> 2019</a:t>
+            </a:r>
           </a:p>
         </p:txBody>
       </p:sp>
@@ -4071,16 +4071,8 @@
           <a:p>
             <a:pPr algn="ctr"/>
             <a:r>
-              <a:rPr lang="en-US" dirty="0" err="1"/>
-              <a:t>DVF_completed</a:t>
-            </a:r>
-            <a:endParaRPr lang="en-US" dirty="0"/>
-          </a:p>
-          <a:p>
-            <a:pPr algn="ctr"/>
-            <a:r>
               <a:rPr lang="en-US" dirty="0"/>
-              <a:t>(2020)</a:t>
+              <a:t>6 – DVF Completed</a:t>
             </a:r>
           </a:p>
         </p:txBody>
@@ -4129,7 +4121,7 @@
             <a:pPr algn="ctr"/>
             <a:r>
               <a:rPr lang="en-US" dirty="0" err="1"/>
-              <a:t>revenus</a:t>
+              <a:t>loyers</a:t>
             </a:r>
             <a:endParaRPr lang="en-US" dirty="0"/>
           </a:p>
@@ -4224,10 +4216,17 @@
           <a:p>
             <a:pPr algn="ctr"/>
             <a:r>
+              <a:rPr lang="en-US" dirty="0"/>
+              <a:t>5 – </a:t>
+            </a:r>
+            <a:r>
               <a:rPr lang="en-US" dirty="0" err="1"/>
-              <a:t>revenus_clean</a:t>
-            </a:r>
-            <a:endParaRPr lang="en-US" dirty="0"/>
+              <a:t>Loyers</a:t>
+            </a:r>
+            <a:r>
+              <a:rPr lang="en-US" dirty="0"/>
+              <a:t> 2018</a:t>
+            </a:r>
           </a:p>
         </p:txBody>
       </p:sp>
@@ -4495,7 +4494,7 @@
         </p:nvSpPr>
         <p:spPr>
           <a:xfrm>
-            <a:off x="4638899" y="4454143"/>
+            <a:off x="2632598" y="4454143"/>
             <a:ext cx="254270" cy="234892"/>
           </a:xfrm>
           <a:prstGeom prst="verticalScroll">
@@ -4523,16 +4522,19 @@
           <a:lstStyle/>
           <a:p>
             <a:pPr algn="ctr"/>
-            <a:endParaRPr lang="en-US" sz="1000"/>
-          </a:p>
-        </p:txBody>
-      </p:sp>
-      <p:sp>
-        <p:nvSpPr>
-          <p:cNvPr id="30" name="Parchemin : vertical 29">
-            <a:extLst>
-              <a:ext uri="{FF2B5EF4-FFF2-40B4-BE49-F238E27FC236}">
-                <a16:creationId xmlns:a16="http://schemas.microsoft.com/office/drawing/2014/main" id="{0BF25710-696D-4073-8834-E460A0F15221}"/>
+            <a:r>
+              <a:rPr lang="en-US" sz="1000" dirty="0"/>
+              <a:t>5A</a:t>
+            </a:r>
+          </a:p>
+        </p:txBody>
+      </p:sp>
+      <p:sp>
+        <p:nvSpPr>
+          <p:cNvPr id="31" name="Parchemin : vertical 30">
+            <a:extLst>
+              <a:ext uri="{FF2B5EF4-FFF2-40B4-BE49-F238E27FC236}">
+                <a16:creationId xmlns:a16="http://schemas.microsoft.com/office/drawing/2014/main" id="{8722652B-E27B-43B7-BD61-778D6AFC1EE4}"/>
               </a:ext>
             </a:extLst>
           </p:cNvPr>
@@ -4541,7 +4543,7 @@
         </p:nvSpPr>
         <p:spPr>
           <a:xfrm>
-            <a:off x="4618206" y="5797816"/>
+            <a:off x="8714601" y="3289605"/>
             <a:ext cx="254270" cy="234892"/>
           </a:xfrm>
           <a:prstGeom prst="verticalScroll">
@@ -4569,16 +4571,19 @@
           <a:lstStyle/>
           <a:p>
             <a:pPr algn="ctr"/>
-            <a:endParaRPr lang="en-US" sz="1000"/>
-          </a:p>
-        </p:txBody>
-      </p:sp>
-      <p:sp>
-        <p:nvSpPr>
-          <p:cNvPr id="31" name="Parchemin : vertical 30">
-            <a:extLst>
-              <a:ext uri="{FF2B5EF4-FFF2-40B4-BE49-F238E27FC236}">
-                <a16:creationId xmlns:a16="http://schemas.microsoft.com/office/drawing/2014/main" id="{8722652B-E27B-43B7-BD61-778D6AFC1EE4}"/>
+            <a:r>
+              <a:rPr lang="en-US" sz="1000" dirty="0"/>
+              <a:t>6</a:t>
+            </a:r>
+          </a:p>
+        </p:txBody>
+      </p:sp>
+      <p:sp>
+        <p:nvSpPr>
+          <p:cNvPr id="32" name="Parchemin : vertical 31">
+            <a:extLst>
+              <a:ext uri="{FF2B5EF4-FFF2-40B4-BE49-F238E27FC236}">
+                <a16:creationId xmlns:a16="http://schemas.microsoft.com/office/drawing/2014/main" id="{A1BC981E-4458-4731-82B5-6DD7E1168BB4}"/>
               </a:ext>
             </a:extLst>
           </p:cNvPr>
@@ -4587,7 +4592,7 @@
         </p:nvSpPr>
         <p:spPr>
           <a:xfrm>
-            <a:off x="8714601" y="3289605"/>
+            <a:off x="5490428" y="1774879"/>
             <a:ext cx="254270" cy="234892"/>
           </a:xfrm>
           <a:prstGeom prst="verticalScroll">
@@ -4615,16 +4620,19 @@
           <a:lstStyle/>
           <a:p>
             <a:pPr algn="ctr"/>
-            <a:endParaRPr lang="en-US" sz="1000"/>
-          </a:p>
-        </p:txBody>
-      </p:sp>
-      <p:sp>
-        <p:nvSpPr>
-          <p:cNvPr id="32" name="Parchemin : vertical 31">
-            <a:extLst>
-              <a:ext uri="{FF2B5EF4-FFF2-40B4-BE49-F238E27FC236}">
-                <a16:creationId xmlns:a16="http://schemas.microsoft.com/office/drawing/2014/main" id="{A1BC981E-4458-4731-82B5-6DD7E1168BB4}"/>
+            <a:r>
+              <a:rPr lang="en-US" sz="1000" dirty="0"/>
+              <a:t>4</a:t>
+            </a:r>
+          </a:p>
+        </p:txBody>
+      </p:sp>
+      <p:sp>
+        <p:nvSpPr>
+          <p:cNvPr id="33" name="Parchemin : vertical 32">
+            <a:extLst>
+              <a:ext uri="{FF2B5EF4-FFF2-40B4-BE49-F238E27FC236}">
+                <a16:creationId xmlns:a16="http://schemas.microsoft.com/office/drawing/2014/main" id="{A7BE41CD-8124-408E-A0BA-FEDF3B5716F8}"/>
               </a:ext>
             </a:extLst>
           </p:cNvPr>
@@ -4633,7 +4641,7 @@
         </p:nvSpPr>
         <p:spPr>
           <a:xfrm>
-            <a:off x="5490428" y="1774879"/>
+            <a:off x="10041460" y="212244"/>
             <a:ext cx="254270" cy="234892"/>
           </a:xfrm>
           <a:prstGeom prst="verticalScroll">
@@ -4657,23 +4665,20 @@
           </a:fontRef>
         </p:style>
         <p:txBody>
-          <a:bodyPr lIns="0" tIns="0" rIns="0" bIns="0" rtlCol="0" anchor="ctr"/>
+          <a:bodyPr rtlCol="0" anchor="ctr"/>
           <a:lstStyle/>
           <a:p>
             <a:pPr algn="ctr"/>
-            <a:r>
-              <a:rPr lang="en-US" sz="1000" dirty="0"/>
-              <a:t>4</a:t>
-            </a:r>
-          </a:p>
-        </p:txBody>
-      </p:sp>
-      <p:sp>
-        <p:nvSpPr>
-          <p:cNvPr id="33" name="Parchemin : vertical 32">
-            <a:extLst>
-              <a:ext uri="{FF2B5EF4-FFF2-40B4-BE49-F238E27FC236}">
-                <a16:creationId xmlns:a16="http://schemas.microsoft.com/office/drawing/2014/main" id="{A7BE41CD-8124-408E-A0BA-FEDF3B5716F8}"/>
+            <a:endParaRPr lang="en-US"/>
+          </a:p>
+        </p:txBody>
+      </p:sp>
+      <p:sp>
+        <p:nvSpPr>
+          <p:cNvPr id="34" name="Cylindre 33">
+            <a:extLst>
+              <a:ext uri="{FF2B5EF4-FFF2-40B4-BE49-F238E27FC236}">
+                <a16:creationId xmlns:a16="http://schemas.microsoft.com/office/drawing/2014/main" id="{60F507C6-7307-4E41-B359-BE90CE2E4880}"/>
               </a:ext>
             </a:extLst>
           </p:cNvPr>
@@ -4682,10 +4687,10 @@
         </p:nvSpPr>
         <p:spPr>
           <a:xfrm>
-            <a:off x="10041460" y="212244"/>
-            <a:ext cx="254270" cy="234892"/>
-          </a:xfrm>
-          <a:prstGeom prst="verticalScroll">
+            <a:off x="10041460" y="557238"/>
+            <a:ext cx="254271" cy="287760"/>
+          </a:xfrm>
+          <a:prstGeom prst="can">
             <a:avLst/>
           </a:prstGeom>
         </p:spPr>
@@ -4710,16 +4715,88 @@
           <a:lstStyle/>
           <a:p>
             <a:pPr algn="ctr"/>
-            <a:endParaRPr lang="en-US"/>
-          </a:p>
-        </p:txBody>
-      </p:sp>
-      <p:sp>
-        <p:nvSpPr>
-          <p:cNvPr id="34" name="Cylindre 33">
-            <a:extLst>
-              <a:ext uri="{FF2B5EF4-FFF2-40B4-BE49-F238E27FC236}">
-                <a16:creationId xmlns:a16="http://schemas.microsoft.com/office/drawing/2014/main" id="{60F507C6-7307-4E41-B359-BE90CE2E4880}"/>
+            <a:endParaRPr lang="en-US" dirty="0"/>
+          </a:p>
+        </p:txBody>
+      </p:sp>
+      <p:sp>
+        <p:nvSpPr>
+          <p:cNvPr id="35" name="ZoneTexte 34">
+            <a:extLst>
+              <a:ext uri="{FF2B5EF4-FFF2-40B4-BE49-F238E27FC236}">
+                <a16:creationId xmlns:a16="http://schemas.microsoft.com/office/drawing/2014/main" id="{4DBE49A3-3477-46A4-83CD-94ABEA27D05A}"/>
+              </a:ext>
+            </a:extLst>
+          </p:cNvPr>
+          <p:cNvSpPr txBox="1"/>
+          <p:nvPr/>
+        </p:nvSpPr>
+        <p:spPr>
+          <a:xfrm>
+            <a:off x="10041460" y="171674"/>
+            <a:ext cx="1267881" cy="276999"/>
+          </a:xfrm>
+          <a:prstGeom prst="rect">
+            <a:avLst/>
+          </a:prstGeom>
+          <a:noFill/>
+        </p:spPr>
+        <p:txBody>
+          <a:bodyPr wrap="square" rtlCol="0">
+            <a:spAutoFit/>
+          </a:bodyPr>
+          <a:lstStyle/>
+          <a:p>
+            <a:pPr algn="ctr"/>
+            <a:r>
+              <a:rPr lang="en-US" sz="1200" dirty="0"/>
+              <a:t>Script</a:t>
+            </a:r>
+          </a:p>
+        </p:txBody>
+      </p:sp>
+      <p:sp>
+        <p:nvSpPr>
+          <p:cNvPr id="36" name="ZoneTexte 35">
+            <a:extLst>
+              <a:ext uri="{FF2B5EF4-FFF2-40B4-BE49-F238E27FC236}">
+                <a16:creationId xmlns:a16="http://schemas.microsoft.com/office/drawing/2014/main" id="{99146FB2-59AC-418C-B639-287F30A2D17C}"/>
+              </a:ext>
+            </a:extLst>
+          </p:cNvPr>
+          <p:cNvSpPr txBox="1"/>
+          <p:nvPr/>
+        </p:nvSpPr>
+        <p:spPr>
+          <a:xfrm>
+            <a:off x="10084997" y="554881"/>
+            <a:ext cx="1267881" cy="276999"/>
+          </a:xfrm>
+          <a:prstGeom prst="rect">
+            <a:avLst/>
+          </a:prstGeom>
+          <a:noFill/>
+        </p:spPr>
+        <p:txBody>
+          <a:bodyPr wrap="square" rtlCol="0">
+            <a:spAutoFit/>
+          </a:bodyPr>
+          <a:lstStyle/>
+          <a:p>
+            <a:pPr algn="ctr"/>
+            <a:r>
+              <a:rPr lang="en-US" sz="1200" dirty="0"/>
+              <a:t>Database</a:t>
+            </a:r>
+          </a:p>
+        </p:txBody>
+      </p:sp>
+      <p:sp>
+        <p:nvSpPr>
+          <p:cNvPr id="43" name="Parchemin : vertical 42">
+            <a:extLst>
+              <a:ext uri="{FF2B5EF4-FFF2-40B4-BE49-F238E27FC236}">
+                <a16:creationId xmlns:a16="http://schemas.microsoft.com/office/drawing/2014/main" id="{AF74CE9E-15D6-4EA7-A115-DA13A5EE0BE2}"/>
               </a:ext>
             </a:extLst>
           </p:cNvPr>
@@ -4728,10 +4805,10 @@
         </p:nvSpPr>
         <p:spPr>
           <a:xfrm>
-            <a:off x="10041460" y="557238"/>
-            <a:ext cx="254271" cy="287760"/>
-          </a:xfrm>
-          <a:prstGeom prst="can">
+            <a:off x="2203705" y="3029823"/>
+            <a:ext cx="254270" cy="234892"/>
+          </a:xfrm>
+          <a:prstGeom prst="verticalScroll">
             <a:avLst/>
           </a:prstGeom>
         </p:spPr>
@@ -4752,20 +4829,23 @@
           </a:fontRef>
         </p:style>
         <p:txBody>
-          <a:bodyPr rtlCol="0" anchor="ctr"/>
+          <a:bodyPr lIns="0" tIns="0" rIns="0" bIns="0" rtlCol="0" anchor="ctr"/>
           <a:lstStyle/>
           <a:p>
             <a:pPr algn="ctr"/>
-            <a:endParaRPr lang="en-US" dirty="0"/>
-          </a:p>
-        </p:txBody>
-      </p:sp>
-      <p:sp>
-        <p:nvSpPr>
-          <p:cNvPr id="35" name="ZoneTexte 34">
-            <a:extLst>
-              <a:ext uri="{FF2B5EF4-FFF2-40B4-BE49-F238E27FC236}">
-                <a16:creationId xmlns:a16="http://schemas.microsoft.com/office/drawing/2014/main" id="{4DBE49A3-3477-46A4-83CD-94ABEA27D05A}"/>
+            <a:r>
+              <a:rPr lang="en-US" sz="1000" dirty="0"/>
+              <a:t>3</a:t>
+            </a:r>
+          </a:p>
+        </p:txBody>
+      </p:sp>
+      <p:sp>
+        <p:nvSpPr>
+          <p:cNvPr id="45" name="ZoneTexte 44">
+            <a:extLst>
+              <a:ext uri="{FF2B5EF4-FFF2-40B4-BE49-F238E27FC236}">
+                <a16:creationId xmlns:a16="http://schemas.microsoft.com/office/drawing/2014/main" id="{EBA713B5-1270-47BA-8067-173769E7E321}"/>
               </a:ext>
             </a:extLst>
           </p:cNvPr>
@@ -4774,8 +4854,8 @@
         </p:nvSpPr>
         <p:spPr>
           <a:xfrm>
-            <a:off x="10041460" y="171674"/>
-            <a:ext cx="1267881" cy="276999"/>
+            <a:off x="2383146" y="980432"/>
+            <a:ext cx="1562034" cy="430887"/>
           </a:xfrm>
           <a:prstGeom prst="rect">
             <a:avLst/>
@@ -4790,18 +4870,27 @@
           <a:p>
             <a:pPr algn="ctr"/>
             <a:r>
-              <a:rPr lang="en-US" sz="1200" dirty="0"/>
-              <a:t>Script</a:t>
-            </a:r>
-          </a:p>
-        </p:txBody>
-      </p:sp>
-      <p:sp>
-        <p:nvSpPr>
-          <p:cNvPr id="36" name="ZoneTexte 35">
-            <a:extLst>
-              <a:ext uri="{FF2B5EF4-FFF2-40B4-BE49-F238E27FC236}">
-                <a16:creationId xmlns:a16="http://schemas.microsoft.com/office/drawing/2014/main" id="{99146FB2-59AC-418C-B639-287F30A2D17C}"/>
+              <a:rPr lang="en-US" sz="1100" dirty="0" err="1"/>
+              <a:t>Nettoyage</a:t>
+            </a:r>
+            <a:r>
+              <a:rPr lang="en-US" sz="1100" dirty="0"/>
+              <a:t> + Export </a:t>
+            </a:r>
+            <a:r>
+              <a:rPr lang="en-US" sz="1100" dirty="0" err="1"/>
+              <a:t>Adresses</a:t>
+            </a:r>
+            <a:endParaRPr lang="en-US" sz="1100" dirty="0"/>
+          </a:p>
+        </p:txBody>
+      </p:sp>
+      <p:sp>
+        <p:nvSpPr>
+          <p:cNvPr id="46" name="ZoneTexte 45">
+            <a:extLst>
+              <a:ext uri="{FF2B5EF4-FFF2-40B4-BE49-F238E27FC236}">
+                <a16:creationId xmlns:a16="http://schemas.microsoft.com/office/drawing/2014/main" id="{116DAEED-583A-40C1-976E-50B2E10C957E}"/>
               </a:ext>
             </a:extLst>
           </p:cNvPr>
@@ -4810,8 +4899,8 @@
         </p:nvSpPr>
         <p:spPr>
           <a:xfrm>
-            <a:off x="10084997" y="554881"/>
-            <a:ext cx="1267881" cy="276999"/>
+            <a:off x="2417145" y="2945182"/>
+            <a:ext cx="1603440" cy="430887"/>
           </a:xfrm>
           <a:prstGeom prst="rect">
             <a:avLst/>
@@ -4826,144 +4915,27 @@
           <a:p>
             <a:pPr algn="ctr"/>
             <a:r>
-              <a:rPr lang="en-US" sz="1200" dirty="0"/>
-              <a:t>Database</a:t>
-            </a:r>
-          </a:p>
-        </p:txBody>
-      </p:sp>
-      <p:sp>
-        <p:nvSpPr>
-          <p:cNvPr id="39" name="ZoneTexte 38">
-            <a:extLst>
-              <a:ext uri="{FF2B5EF4-FFF2-40B4-BE49-F238E27FC236}">
-                <a16:creationId xmlns:a16="http://schemas.microsoft.com/office/drawing/2014/main" id="{D2998151-E185-4709-B796-DB66F5DB2DDE}"/>
-              </a:ext>
-            </a:extLst>
-          </p:cNvPr>
-          <p:cNvSpPr txBox="1"/>
-          <p:nvPr/>
-        </p:nvSpPr>
-        <p:spPr>
-          <a:xfrm>
-            <a:off x="4962732" y="4439682"/>
-            <a:ext cx="860120" cy="276999"/>
-          </a:xfrm>
-          <a:prstGeom prst="rect">
-            <a:avLst/>
-          </a:prstGeom>
-          <a:solidFill>
-            <a:schemeClr val="accent2"/>
-          </a:solidFill>
-        </p:spPr>
-        <p:txBody>
-          <a:bodyPr wrap="square" rtlCol="0">
-            <a:spAutoFit/>
-          </a:bodyPr>
-          <a:lstStyle/>
-          <a:p>
-            <a:pPr algn="ctr"/>
-            <a:r>
-              <a:rPr lang="en-US" sz="1200" dirty="0">
-                <a:solidFill>
-                  <a:schemeClr val="bg1"/>
-                </a:solidFill>
-              </a:rPr>
-              <a:t>Yvan</a:t>
-            </a:r>
-          </a:p>
-        </p:txBody>
-      </p:sp>
-      <p:sp>
-        <p:nvSpPr>
-          <p:cNvPr id="40" name="ZoneTexte 39">
-            <a:extLst>
-              <a:ext uri="{FF2B5EF4-FFF2-40B4-BE49-F238E27FC236}">
-                <a16:creationId xmlns:a16="http://schemas.microsoft.com/office/drawing/2014/main" id="{C7737D29-9EE3-41D3-83BC-5D09F0E35283}"/>
-              </a:ext>
-            </a:extLst>
-          </p:cNvPr>
-          <p:cNvSpPr txBox="1"/>
-          <p:nvPr/>
-        </p:nvSpPr>
-        <p:spPr>
-          <a:xfrm>
-            <a:off x="4979200" y="5787943"/>
-            <a:ext cx="860120" cy="276999"/>
-          </a:xfrm>
-          <a:prstGeom prst="rect">
-            <a:avLst/>
-          </a:prstGeom>
-          <a:solidFill>
-            <a:schemeClr val="accent2"/>
-          </a:solidFill>
-        </p:spPr>
-        <p:txBody>
-          <a:bodyPr wrap="square" rtlCol="0">
-            <a:spAutoFit/>
-          </a:bodyPr>
-          <a:lstStyle/>
-          <a:p>
-            <a:pPr algn="ctr"/>
-            <a:r>
-              <a:rPr lang="en-US" sz="1200" dirty="0">
-                <a:solidFill>
-                  <a:schemeClr val="bg1"/>
-                </a:solidFill>
-              </a:rPr>
-              <a:t>Yvan</a:t>
-            </a:r>
-          </a:p>
-        </p:txBody>
-      </p:sp>
-      <p:sp>
-        <p:nvSpPr>
-          <p:cNvPr id="42" name="ZoneTexte 41">
-            <a:extLst>
-              <a:ext uri="{FF2B5EF4-FFF2-40B4-BE49-F238E27FC236}">
-                <a16:creationId xmlns:a16="http://schemas.microsoft.com/office/drawing/2014/main" id="{EEA9C991-8FBE-4AA3-BCB4-8490590E4E52}"/>
-              </a:ext>
-            </a:extLst>
-          </p:cNvPr>
-          <p:cNvSpPr txBox="1"/>
-          <p:nvPr/>
-        </p:nvSpPr>
-        <p:spPr>
-          <a:xfrm>
-            <a:off x="8385689" y="2912539"/>
-            <a:ext cx="860120" cy="276999"/>
-          </a:xfrm>
-          <a:prstGeom prst="rect">
-            <a:avLst/>
-          </a:prstGeom>
-          <a:solidFill>
-            <a:schemeClr val="accent2"/>
-          </a:solidFill>
-        </p:spPr>
-        <p:txBody>
-          <a:bodyPr wrap="square" rtlCol="0">
-            <a:spAutoFit/>
-          </a:bodyPr>
-          <a:lstStyle/>
-          <a:p>
-            <a:pPr algn="ctr"/>
-            <a:r>
-              <a:rPr lang="en-US" sz="1200" dirty="0">
-                <a:solidFill>
-                  <a:schemeClr val="bg1"/>
-                </a:solidFill>
-              </a:rPr>
-              <a:t>?</a:t>
-            </a:r>
-          </a:p>
-        </p:txBody>
-      </p:sp>
-      <p:sp>
-        <p:nvSpPr>
-          <p:cNvPr id="43" name="Parchemin : vertical 42">
-            <a:extLst>
-              <a:ext uri="{FF2B5EF4-FFF2-40B4-BE49-F238E27FC236}">
-                <a16:creationId xmlns:a16="http://schemas.microsoft.com/office/drawing/2014/main" id="{AF74CE9E-15D6-4EA7-A115-DA13A5EE0BE2}"/>
+              <a:rPr lang="en-US" sz="1100" dirty="0" err="1"/>
+              <a:t>Concaténation</a:t>
+            </a:r>
+            <a:r>
+              <a:rPr lang="en-US" sz="1100" dirty="0"/>
+              <a:t> des </a:t>
+            </a:r>
+            <a:r>
+              <a:rPr lang="en-US" sz="1100" dirty="0" err="1"/>
+              <a:t>fichiers</a:t>
+            </a:r>
+            <a:endParaRPr lang="en-US" sz="1100" dirty="0"/>
+          </a:p>
+        </p:txBody>
+      </p:sp>
+      <p:sp>
+        <p:nvSpPr>
+          <p:cNvPr id="47" name="Parchemin : vertical 46">
+            <a:extLst>
+              <a:ext uri="{FF2B5EF4-FFF2-40B4-BE49-F238E27FC236}">
+                <a16:creationId xmlns:a16="http://schemas.microsoft.com/office/drawing/2014/main" id="{AF2C60F1-E1CB-4165-83F7-55BE8ABBDDDB}"/>
               </a:ext>
             </a:extLst>
           </p:cNvPr>
@@ -4972,7 +4944,7 @@
         </p:nvSpPr>
         <p:spPr>
           <a:xfrm>
-            <a:off x="2203705" y="3029823"/>
+            <a:off x="2239093" y="2010988"/>
             <a:ext cx="254270" cy="234892"/>
           </a:xfrm>
           <a:prstGeom prst="verticalScroll">
@@ -5002,17 +4974,17 @@
             <a:pPr algn="ctr"/>
             <a:r>
               <a:rPr lang="en-US" sz="1000" dirty="0"/>
-              <a:t>3</a:t>
-            </a:r>
-          </a:p>
-        </p:txBody>
-      </p:sp>
-      <p:sp>
-        <p:nvSpPr>
-          <p:cNvPr id="45" name="ZoneTexte 44">
-            <a:extLst>
-              <a:ext uri="{FF2B5EF4-FFF2-40B4-BE49-F238E27FC236}">
-                <a16:creationId xmlns:a16="http://schemas.microsoft.com/office/drawing/2014/main" id="{EBA713B5-1270-47BA-8067-173769E7E321}"/>
+              <a:t>1C</a:t>
+            </a:r>
+          </a:p>
+        </p:txBody>
+      </p:sp>
+      <p:sp>
+        <p:nvSpPr>
+          <p:cNvPr id="48" name="ZoneTexte 47">
+            <a:extLst>
+              <a:ext uri="{FF2B5EF4-FFF2-40B4-BE49-F238E27FC236}">
+                <a16:creationId xmlns:a16="http://schemas.microsoft.com/office/drawing/2014/main" id="{2ECA9686-E376-4D39-928E-09F394B877B0}"/>
               </a:ext>
             </a:extLst>
           </p:cNvPr>
@@ -5021,8 +4993,8 @@
         </p:nvSpPr>
         <p:spPr>
           <a:xfrm>
-            <a:off x="2383146" y="980432"/>
-            <a:ext cx="1562034" cy="430887"/>
+            <a:off x="2468122" y="1905484"/>
+            <a:ext cx="1432808" cy="430887"/>
           </a:xfrm>
           <a:prstGeom prst="rect">
             <a:avLst/>
@@ -5038,52 +5010,7 @@
             <a:pPr algn="ctr"/>
             <a:r>
               <a:rPr lang="en-US" sz="1100" dirty="0" err="1"/>
-              <a:t>Nettoyage</a:t>
-            </a:r>
-            <a:r>
-              <a:rPr lang="en-US" sz="1100" dirty="0"/>
-              <a:t> + Export </a:t>
-            </a:r>
-            <a:r>
-              <a:rPr lang="en-US" sz="1100" dirty="0" err="1"/>
-              <a:t>Adresses</a:t>
-            </a:r>
-            <a:endParaRPr lang="en-US" sz="1100" dirty="0"/>
-          </a:p>
-        </p:txBody>
-      </p:sp>
-      <p:sp>
-        <p:nvSpPr>
-          <p:cNvPr id="46" name="ZoneTexte 45">
-            <a:extLst>
-              <a:ext uri="{FF2B5EF4-FFF2-40B4-BE49-F238E27FC236}">
-                <a16:creationId xmlns:a16="http://schemas.microsoft.com/office/drawing/2014/main" id="{116DAEED-583A-40C1-976E-50B2E10C957E}"/>
-              </a:ext>
-            </a:extLst>
-          </p:cNvPr>
-          <p:cNvSpPr txBox="1"/>
-          <p:nvPr/>
-        </p:nvSpPr>
-        <p:spPr>
-          <a:xfrm>
-            <a:off x="2417145" y="2945182"/>
-            <a:ext cx="1603440" cy="430887"/>
-          </a:xfrm>
-          <a:prstGeom prst="rect">
-            <a:avLst/>
-          </a:prstGeom>
-          <a:noFill/>
-        </p:spPr>
-        <p:txBody>
-          <a:bodyPr wrap="square" rtlCol="0">
-            <a:spAutoFit/>
-          </a:bodyPr>
-          <a:lstStyle/>
-          <a:p>
-            <a:pPr algn="ctr"/>
-            <a:r>
-              <a:rPr lang="en-US" sz="1100" dirty="0" err="1"/>
-              <a:t>Concaténation</a:t>
+              <a:t>Déduplication</a:t>
             </a:r>
             <a:r>
               <a:rPr lang="en-US" sz="1100" dirty="0"/>
@@ -5091,7 +5018,7 @@
             </a:r>
             <a:r>
               <a:rPr lang="en-US" sz="1100" dirty="0" err="1"/>
-              <a:t>fichiers</a:t>
+              <a:t>adresses</a:t>
             </a:r>
             <a:endParaRPr lang="en-US" sz="1100" dirty="0"/>
           </a:p>
@@ -5099,10 +5026,10 @@
       </p:sp>
       <p:sp>
         <p:nvSpPr>
-          <p:cNvPr id="47" name="Parchemin : vertical 46">
-            <a:extLst>
-              <a:ext uri="{FF2B5EF4-FFF2-40B4-BE49-F238E27FC236}">
-                <a16:creationId xmlns:a16="http://schemas.microsoft.com/office/drawing/2014/main" id="{AF2C60F1-E1CB-4165-83F7-55BE8ABBDDDB}"/>
+          <p:cNvPr id="44" name="Parchemin : vertical 43">
+            <a:extLst>
+              <a:ext uri="{FF2B5EF4-FFF2-40B4-BE49-F238E27FC236}">
+                <a16:creationId xmlns:a16="http://schemas.microsoft.com/office/drawing/2014/main" id="{B72011B6-93DE-4844-9B34-23B26267EE89}"/>
               </a:ext>
             </a:extLst>
           </p:cNvPr>
@@ -5111,7 +5038,7 @@
         </p:nvSpPr>
         <p:spPr>
           <a:xfrm>
-            <a:off x="2239093" y="2010988"/>
+            <a:off x="2664359" y="5782729"/>
             <a:ext cx="254270" cy="234892"/>
           </a:xfrm>
           <a:prstGeom prst="verticalScroll">
@@ -5141,53 +5068,8 @@
             <a:pPr algn="ctr"/>
             <a:r>
               <a:rPr lang="en-US" sz="1000" dirty="0"/>
-              <a:t>1C</a:t>
-            </a:r>
-          </a:p>
-        </p:txBody>
-      </p:sp>
-      <p:sp>
-        <p:nvSpPr>
-          <p:cNvPr id="48" name="ZoneTexte 47">
-            <a:extLst>
-              <a:ext uri="{FF2B5EF4-FFF2-40B4-BE49-F238E27FC236}">
-                <a16:creationId xmlns:a16="http://schemas.microsoft.com/office/drawing/2014/main" id="{2ECA9686-E376-4D39-928E-09F394B877B0}"/>
-              </a:ext>
-            </a:extLst>
-          </p:cNvPr>
-          <p:cNvSpPr txBox="1"/>
-          <p:nvPr/>
-        </p:nvSpPr>
-        <p:spPr>
-          <a:xfrm>
-            <a:off x="2468122" y="1905484"/>
-            <a:ext cx="1432808" cy="430887"/>
-          </a:xfrm>
-          <a:prstGeom prst="rect">
-            <a:avLst/>
-          </a:prstGeom>
-          <a:noFill/>
-        </p:spPr>
-        <p:txBody>
-          <a:bodyPr wrap="square" rtlCol="0">
-            <a:spAutoFit/>
-          </a:bodyPr>
-          <a:lstStyle/>
-          <a:p>
-            <a:pPr algn="ctr"/>
-            <a:r>
-              <a:rPr lang="en-US" sz="1100" dirty="0" err="1"/>
-              <a:t>Déduplication</a:t>
-            </a:r>
-            <a:r>
-              <a:rPr lang="en-US" sz="1100" dirty="0"/>
-              <a:t> des </a:t>
-            </a:r>
-            <a:r>
-              <a:rPr lang="en-US" sz="1100" dirty="0" err="1"/>
-              <a:t>adresses</a:t>
-            </a:r>
-            <a:endParaRPr lang="en-US" sz="1100" dirty="0"/>
+              <a:t>5B</a:t>
+            </a:r>
           </a:p>
         </p:txBody>
       </p:sp>

</xml_diff>